<commit_message>
Modifications de dernière minute
</commit_message>
<xml_diff>
--- a/G6_presentation_intermediaire_fuchs_butty_rial.pptx
+++ b/G6_presentation_intermediaire_fuchs_butty_rial.pptx
@@ -2895,7 +2895,7 @@
             </a:pPr>
             <a:fld id="{00000000-1234-1234-1234-123412341234}" type="slidenum">
               <a:rPr lang="fr-CH"/>
-              <a:t>‹#›</a:t>
+              <a:t>‹N°›</a:t>
             </a:fld>
             <a:endParaRPr/>
           </a:p>
@@ -3583,7 +3583,7 @@
             </a:pPr>
             <a:fld id="{00000000-1234-1234-1234-123412341234}" type="slidenum">
               <a:rPr lang="fr-CH"/>
-              <a:t>‹#›</a:t>
+              <a:t>‹N°›</a:t>
             </a:fld>
             <a:endParaRPr/>
           </a:p>
@@ -4271,7 +4271,7 @@
             </a:pPr>
             <a:fld id="{00000000-1234-1234-1234-123412341234}" type="slidenum">
               <a:rPr lang="fr-CH"/>
-              <a:t>‹#›</a:t>
+              <a:t>‹N°›</a:t>
             </a:fld>
             <a:endParaRPr/>
           </a:p>
@@ -4959,7 +4959,7 @@
             </a:pPr>
             <a:fld id="{00000000-1234-1234-1234-123412341234}" type="slidenum">
               <a:rPr lang="fr-CH"/>
-              <a:t>‹#›</a:t>
+              <a:t>‹N°›</a:t>
             </a:fld>
             <a:endParaRPr/>
           </a:p>
@@ -5647,7 +5647,7 @@
             </a:pPr>
             <a:fld id="{00000000-1234-1234-1234-123412341234}" type="slidenum">
               <a:rPr lang="fr-CH"/>
-              <a:t>‹#›</a:t>
+              <a:t>‹N°›</a:t>
             </a:fld>
             <a:endParaRPr/>
           </a:p>
@@ -6586,7 +6586,7 @@
             </a:pPr>
             <a:fld id="{00000000-1234-1234-1234-123412341234}" type="slidenum">
               <a:rPr lang="fr-CH"/>
-              <a:t>‹#›</a:t>
+              <a:t>‹N°›</a:t>
             </a:fld>
             <a:endParaRPr/>
           </a:p>
@@ -8027,7 +8027,7 @@
             </a:pPr>
             <a:fld id="{00000000-1234-1234-1234-123412341234}" type="slidenum">
               <a:rPr lang="fr-CH"/>
-              <a:t>‹#›</a:t>
+              <a:t>‹N°›</a:t>
             </a:fld>
             <a:endParaRPr/>
           </a:p>
@@ -8464,7 +8464,7 @@
             </a:pPr>
             <a:fld id="{00000000-1234-1234-1234-123412341234}" type="slidenum">
               <a:rPr lang="fr-CH"/>
-              <a:t>‹#›</a:t>
+              <a:t>‹N°›</a:t>
             </a:fld>
             <a:endParaRPr/>
           </a:p>
@@ -8698,7 +8698,7 @@
             </a:pPr>
             <a:fld id="{00000000-1234-1234-1234-123412341234}" type="slidenum">
               <a:rPr lang="fr-CH"/>
-              <a:t>‹#›</a:t>
+              <a:t>‹N°›</a:t>
             </a:fld>
             <a:endParaRPr/>
           </a:p>
@@ -9637,7 +9637,7 @@
             </a:pPr>
             <a:fld id="{00000000-1234-1234-1234-123412341234}" type="slidenum">
               <a:rPr lang="fr-CH"/>
-              <a:t>‹#›</a:t>
+              <a:t>‹N°›</a:t>
             </a:fld>
             <a:endParaRPr/>
           </a:p>
@@ -10576,7 +10576,7 @@
             </a:pPr>
             <a:fld id="{00000000-1234-1234-1234-123412341234}" type="slidenum">
               <a:rPr lang="fr-CH"/>
-              <a:t>‹#›</a:t>
+              <a:t>‹N°›</a:t>
             </a:fld>
             <a:endParaRPr/>
           </a:p>
@@ -11272,7 +11272,7 @@
             </a:pPr>
             <a:fld id="{00000000-1234-1234-1234-123412341234}" type="slidenum">
               <a:rPr lang="fr-CH"/>
-              <a:t>‹#›</a:t>
+              <a:t>‹N°›</a:t>
             </a:fld>
             <a:endParaRPr/>
           </a:p>
@@ -14505,7 +14505,7 @@
           <p:nvPr>
             <p:extLst>
               <p:ext uri="{D42A27DB-BD31-4B8C-83A1-F6EECF244321}">
-                <p14:modId xmlns:p14="http://schemas.microsoft.com/office/powerpoint/2010/main" val="964445884"/>
+                <p14:modId xmlns:p14="http://schemas.microsoft.com/office/powerpoint/2010/main" val="3384113256"/>
               </p:ext>
             </p:extLst>
           </p:nvPr>
@@ -14522,11 +14522,41 @@
                 <a:tableStyleId>{08322F62-2FF7-4121-ACE4-5C842E3B7A08}</a:tableStyleId>
               </a:tblPr>
               <a:tblGrid>
-                <a:gridCol w="1425450"/>
-                <a:gridCol w="783771"/>
-                <a:gridCol w="1600200"/>
-                <a:gridCol w="1959429"/>
-                <a:gridCol w="1447800"/>
+                <a:gridCol w="1425450">
+                  <a:extLst>
+                    <a:ext uri="{9D8B030D-6E8A-4147-A177-3AD203B41FA5}">
+                      <a16:colId xmlns:a16="http://schemas.microsoft.com/office/drawing/2014/main" val="20000"/>
+                    </a:ext>
+                  </a:extLst>
+                </a:gridCol>
+                <a:gridCol w="783771">
+                  <a:extLst>
+                    <a:ext uri="{9D8B030D-6E8A-4147-A177-3AD203B41FA5}">
+                      <a16:colId xmlns:a16="http://schemas.microsoft.com/office/drawing/2014/main" val="20001"/>
+                    </a:ext>
+                  </a:extLst>
+                </a:gridCol>
+                <a:gridCol w="1600200">
+                  <a:extLst>
+                    <a:ext uri="{9D8B030D-6E8A-4147-A177-3AD203B41FA5}">
+                      <a16:colId xmlns:a16="http://schemas.microsoft.com/office/drawing/2014/main" val="20002"/>
+                    </a:ext>
+                  </a:extLst>
+                </a:gridCol>
+                <a:gridCol w="1959429">
+                  <a:extLst>
+                    <a:ext uri="{9D8B030D-6E8A-4147-A177-3AD203B41FA5}">
+                      <a16:colId xmlns:a16="http://schemas.microsoft.com/office/drawing/2014/main" val="20003"/>
+                    </a:ext>
+                  </a:extLst>
+                </a:gridCol>
+                <a:gridCol w="1447800">
+                  <a:extLst>
+                    <a:ext uri="{9D8B030D-6E8A-4147-A177-3AD203B41FA5}">
+                      <a16:colId xmlns:a16="http://schemas.microsoft.com/office/drawing/2014/main" val="20004"/>
+                    </a:ext>
+                  </a:extLst>
+                </a:gridCol>
               </a:tblGrid>
               <a:tr h="381000">
                 <a:tc>
@@ -14604,7 +14634,7 @@
                         <a:buNone/>
                       </a:pPr>
                       <a:r>
-                        <a:rPr lang="fr-CH" dirty="0" smtClean="0"/>
+                        <a:rPr lang="fr-CH" dirty="0"/>
                         <a:t>Pond.</a:t>
                       </a:r>
                       <a:endParaRPr dirty="0"/>
@@ -14664,8 +14694,8 @@
                         <a:buNone/>
                       </a:pPr>
                       <a:r>
-                        <a:rPr lang="fr-CH" dirty="0"/>
-                        <a:t>Angular2</a:t>
+                        <a:rPr lang="fr-CH" dirty="0" err="1"/>
+                        <a:t>Angular</a:t>
                       </a:r>
                       <a:endParaRPr dirty="0"/>
                     </a:p>
@@ -14829,6 +14859,11 @@
                     </a:lnB>
                   </a:tcPr>
                 </a:tc>
+                <a:extLst>
+                  <a:ext uri="{0D108BD9-81ED-4DB2-BD59-A6C34878D82A}">
+                    <a16:rowId xmlns:a16="http://schemas.microsoft.com/office/drawing/2014/main" val="10000"/>
+                  </a:ext>
+                </a:extLst>
               </a:tr>
               <a:tr h="381000">
                 <a:tc>
@@ -14966,7 +15001,7 @@
                         <a:buNone/>
                       </a:pPr>
                       <a:r>
-                        <a:rPr lang="fr-CH" dirty="0" smtClean="0"/>
+                        <a:rPr lang="fr-CH" dirty="0"/>
                         <a:t>7</a:t>
                       </a:r>
                       <a:endParaRPr dirty="0"/>
@@ -15026,7 +15061,7 @@
                         <a:buNone/>
                       </a:pPr>
                       <a:r>
-                        <a:rPr lang="fr-CH" dirty="0" smtClean="0"/>
+                        <a:rPr lang="fr-CH" dirty="0"/>
                         <a:t>6</a:t>
                       </a:r>
                       <a:endParaRPr dirty="0"/>
@@ -15086,7 +15121,7 @@
                         <a:buNone/>
                       </a:pPr>
                       <a:r>
-                        <a:rPr lang="fr-CH" dirty="0" smtClean="0"/>
+                        <a:rPr lang="fr-CH" dirty="0"/>
                         <a:t>8</a:t>
                       </a:r>
                       <a:endParaRPr dirty="0"/>
@@ -15131,6 +15166,11 @@
                     </a:lnB>
                   </a:tcPr>
                 </a:tc>
+                <a:extLst>
+                  <a:ext uri="{0D108BD9-81ED-4DB2-BD59-A6C34878D82A}">
+                    <a16:rowId xmlns:a16="http://schemas.microsoft.com/office/drawing/2014/main" val="10001"/>
+                  </a:ext>
+                </a:extLst>
               </a:tr>
               <a:tr h="381000">
                 <a:tc>
@@ -15268,7 +15308,7 @@
                         <a:buNone/>
                       </a:pPr>
                       <a:r>
-                        <a:rPr lang="fr-CH" dirty="0" smtClean="0"/>
+                        <a:rPr lang="fr-CH" dirty="0"/>
                         <a:t>5</a:t>
                       </a:r>
                       <a:endParaRPr dirty="0"/>
@@ -15328,7 +15368,7 @@
                         <a:buNone/>
                       </a:pPr>
                       <a:r>
-                        <a:rPr lang="fr-CH" dirty="0" smtClean="0"/>
+                        <a:rPr lang="fr-CH" dirty="0"/>
                         <a:t>7</a:t>
                       </a:r>
                       <a:endParaRPr dirty="0"/>
@@ -15388,7 +15428,7 @@
                         <a:buNone/>
                       </a:pPr>
                       <a:r>
-                        <a:rPr lang="fr-CH" dirty="0" smtClean="0"/>
+                        <a:rPr lang="fr-CH" dirty="0"/>
                         <a:t>6</a:t>
                       </a:r>
                       <a:endParaRPr dirty="0"/>
@@ -15433,6 +15473,11 @@
                     </a:lnB>
                   </a:tcPr>
                 </a:tc>
+                <a:extLst>
+                  <a:ext uri="{0D108BD9-81ED-4DB2-BD59-A6C34878D82A}">
+                    <a16:rowId xmlns:a16="http://schemas.microsoft.com/office/drawing/2014/main" val="10002"/>
+                  </a:ext>
+                </a:extLst>
               </a:tr>
               <a:tr h="381000">
                 <a:tc>
@@ -15630,7 +15675,7 @@
                         <a:buNone/>
                       </a:pPr>
                       <a:r>
-                        <a:rPr lang="fr-CH" dirty="0" smtClean="0"/>
+                        <a:rPr lang="fr-CH" dirty="0"/>
                         <a:t>8</a:t>
                       </a:r>
                       <a:endParaRPr dirty="0"/>
@@ -15690,7 +15735,7 @@
                         <a:buNone/>
                       </a:pPr>
                       <a:r>
-                        <a:rPr lang="fr-CH" dirty="0" smtClean="0"/>
+                        <a:rPr lang="fr-CH" dirty="0"/>
                         <a:t>8</a:t>
                       </a:r>
                       <a:endParaRPr dirty="0"/>
@@ -15735,6 +15780,11 @@
                     </a:lnB>
                   </a:tcPr>
                 </a:tc>
+                <a:extLst>
+                  <a:ext uri="{0D108BD9-81ED-4DB2-BD59-A6C34878D82A}">
+                    <a16:rowId xmlns:a16="http://schemas.microsoft.com/office/drawing/2014/main" val="10003"/>
+                  </a:ext>
+                </a:extLst>
               </a:tr>
               <a:tr h="381000">
                 <a:tc>
@@ -15872,7 +15922,7 @@
                         <a:buNone/>
                       </a:pPr>
                       <a:r>
-                        <a:rPr lang="fr-CH" dirty="0" smtClean="0"/>
+                        <a:rPr lang="fr-CH" dirty="0"/>
                         <a:t>7</a:t>
                       </a:r>
                       <a:endParaRPr dirty="0"/>
@@ -15932,7 +15982,7 @@
                         <a:buNone/>
                       </a:pPr>
                       <a:r>
-                        <a:rPr lang="fr-CH" dirty="0" smtClean="0"/>
+                        <a:rPr lang="fr-CH" dirty="0"/>
                         <a:t>6</a:t>
                       </a:r>
                       <a:endParaRPr dirty="0"/>
@@ -15992,7 +16042,7 @@
                         <a:buNone/>
                       </a:pPr>
                       <a:r>
-                        <a:rPr lang="fr-CH" dirty="0" smtClean="0"/>
+                        <a:rPr lang="fr-CH" dirty="0"/>
                         <a:t>7</a:t>
                       </a:r>
                       <a:endParaRPr dirty="0"/>
@@ -16037,6 +16087,11 @@
                     </a:lnB>
                   </a:tcPr>
                 </a:tc>
+                <a:extLst>
+                  <a:ext uri="{0D108BD9-81ED-4DB2-BD59-A6C34878D82A}">
+                    <a16:rowId xmlns:a16="http://schemas.microsoft.com/office/drawing/2014/main" val="10004"/>
+                  </a:ext>
+                </a:extLst>
               </a:tr>
               <a:tr h="381000">
                 <a:tc>
@@ -16174,7 +16229,7 @@
                         <a:buNone/>
                       </a:pPr>
                       <a:r>
-                        <a:rPr lang="fr-CH" dirty="0" smtClean="0"/>
+                        <a:rPr lang="fr-CH" dirty="0"/>
                         <a:t>7</a:t>
                       </a:r>
                       <a:endParaRPr dirty="0"/>
@@ -16234,7 +16289,7 @@
                         <a:buNone/>
                       </a:pPr>
                       <a:r>
-                        <a:rPr lang="fr-CH" dirty="0" smtClean="0"/>
+                        <a:rPr lang="fr-CH" dirty="0"/>
                         <a:t>7</a:t>
                       </a:r>
                       <a:endParaRPr dirty="0"/>
@@ -16294,7 +16349,7 @@
                         <a:buNone/>
                       </a:pPr>
                       <a:r>
-                        <a:rPr lang="fr-CH" dirty="0" smtClean="0"/>
+                        <a:rPr lang="fr-CH" dirty="0"/>
                         <a:t>8</a:t>
                       </a:r>
                       <a:endParaRPr dirty="0"/>
@@ -16339,6 +16394,11 @@
                     </a:lnB>
                   </a:tcPr>
                 </a:tc>
+                <a:extLst>
+                  <a:ext uri="{0D108BD9-81ED-4DB2-BD59-A6C34878D82A}">
+                    <a16:rowId xmlns:a16="http://schemas.microsoft.com/office/drawing/2014/main" val="10005"/>
+                  </a:ext>
+                </a:extLst>
               </a:tr>
               <a:tr h="381000">
                 <a:tc>
@@ -16536,7 +16596,7 @@
                         <a:buNone/>
                       </a:pPr>
                       <a:r>
-                        <a:rPr lang="fr-CH" dirty="0" smtClean="0"/>
+                        <a:rPr lang="fr-CH" dirty="0"/>
                         <a:t>8</a:t>
                       </a:r>
                       <a:endParaRPr dirty="0"/>
@@ -16596,7 +16656,7 @@
                         <a:buNone/>
                       </a:pPr>
                       <a:r>
-                        <a:rPr lang="fr-CH" dirty="0" smtClean="0"/>
+                        <a:rPr lang="fr-CH" dirty="0"/>
                         <a:t>7</a:t>
                       </a:r>
                       <a:endParaRPr dirty="0"/>
@@ -16641,6 +16701,11 @@
                     </a:lnB>
                   </a:tcPr>
                 </a:tc>
+                <a:extLst>
+                  <a:ext uri="{0D108BD9-81ED-4DB2-BD59-A6C34878D82A}">
+                    <a16:rowId xmlns:a16="http://schemas.microsoft.com/office/drawing/2014/main" val="10006"/>
+                  </a:ext>
+                </a:extLst>
               </a:tr>
               <a:tr h="381000">
                 <a:tc>
@@ -16778,7 +16843,7 @@
                         <a:buNone/>
                       </a:pPr>
                       <a:r>
-                        <a:rPr lang="fr-CH" dirty="0" smtClean="0"/>
+                        <a:rPr lang="fr-CH" dirty="0"/>
                         <a:t>7</a:t>
                       </a:r>
                       <a:endParaRPr dirty="0"/>
@@ -16838,7 +16903,7 @@
                         <a:buNone/>
                       </a:pPr>
                       <a:r>
-                        <a:rPr lang="fr-CH" dirty="0" smtClean="0"/>
+                        <a:rPr lang="fr-CH" dirty="0"/>
                         <a:t>0</a:t>
                       </a:r>
                       <a:endParaRPr dirty="0"/>
@@ -16898,7 +16963,7 @@
                         <a:buNone/>
                       </a:pPr>
                       <a:r>
-                        <a:rPr lang="fr-CH" dirty="0" smtClean="0"/>
+                        <a:rPr lang="fr-CH" dirty="0"/>
                         <a:t>0</a:t>
                       </a:r>
                       <a:endParaRPr dirty="0"/>
@@ -16943,6 +17008,11 @@
                     </a:lnB>
                   </a:tcPr>
                 </a:tc>
+                <a:extLst>
+                  <a:ext uri="{0D108BD9-81ED-4DB2-BD59-A6C34878D82A}">
+                    <a16:rowId xmlns:a16="http://schemas.microsoft.com/office/drawing/2014/main" val="10007"/>
+                  </a:ext>
+                </a:extLst>
               </a:tr>
               <a:tr h="381000">
                 <a:tc>
@@ -17020,7 +17090,7 @@
                         <a:buNone/>
                       </a:pPr>
                       <a:r>
-                        <a:rPr lang="fr-CH" dirty="0" smtClean="0"/>
+                        <a:rPr lang="fr-CH" dirty="0"/>
                         <a:t>-</a:t>
                       </a:r>
                       <a:endParaRPr dirty="0"/>
@@ -17253,6 +17323,11 @@
                     </a:lnB>
                   </a:tcPr>
                 </a:tc>
+                <a:extLst>
+                  <a:ext uri="{0D108BD9-81ED-4DB2-BD59-A6C34878D82A}">
+                    <a16:rowId xmlns:a16="http://schemas.microsoft.com/office/drawing/2014/main" val="10008"/>
+                  </a:ext>
+                </a:extLst>
               </a:tr>
             </a:tbl>
           </a:graphicData>
@@ -17371,11 +17446,41 @@
                 <a:tableStyleId>{08322F62-2FF7-4121-ACE4-5C842E3B7A08}</a:tableStyleId>
               </a:tblPr>
               <a:tblGrid>
-                <a:gridCol w="1425450"/>
-                <a:gridCol w="783771"/>
-                <a:gridCol w="1600200"/>
-                <a:gridCol w="1959429"/>
-                <a:gridCol w="1447800"/>
+                <a:gridCol w="1425450">
+                  <a:extLst>
+                    <a:ext uri="{9D8B030D-6E8A-4147-A177-3AD203B41FA5}">
+                      <a16:colId xmlns:a16="http://schemas.microsoft.com/office/drawing/2014/main" val="20000"/>
+                    </a:ext>
+                  </a:extLst>
+                </a:gridCol>
+                <a:gridCol w="783771">
+                  <a:extLst>
+                    <a:ext uri="{9D8B030D-6E8A-4147-A177-3AD203B41FA5}">
+                      <a16:colId xmlns:a16="http://schemas.microsoft.com/office/drawing/2014/main" val="20001"/>
+                    </a:ext>
+                  </a:extLst>
+                </a:gridCol>
+                <a:gridCol w="1600200">
+                  <a:extLst>
+                    <a:ext uri="{9D8B030D-6E8A-4147-A177-3AD203B41FA5}">
+                      <a16:colId xmlns:a16="http://schemas.microsoft.com/office/drawing/2014/main" val="20002"/>
+                    </a:ext>
+                  </a:extLst>
+                </a:gridCol>
+                <a:gridCol w="1959429">
+                  <a:extLst>
+                    <a:ext uri="{9D8B030D-6E8A-4147-A177-3AD203B41FA5}">
+                      <a16:colId xmlns:a16="http://schemas.microsoft.com/office/drawing/2014/main" val="20003"/>
+                    </a:ext>
+                  </a:extLst>
+                </a:gridCol>
+                <a:gridCol w="1447800">
+                  <a:extLst>
+                    <a:ext uri="{9D8B030D-6E8A-4147-A177-3AD203B41FA5}">
+                      <a16:colId xmlns:a16="http://schemas.microsoft.com/office/drawing/2014/main" val="20004"/>
+                    </a:ext>
+                  </a:extLst>
+                </a:gridCol>
               </a:tblGrid>
               <a:tr h="381000">
                 <a:tc>
@@ -17453,7 +17558,7 @@
                         <a:buNone/>
                       </a:pPr>
                       <a:r>
-                        <a:rPr lang="fr-CH" dirty="0" smtClean="0"/>
+                        <a:rPr lang="fr-CH" dirty="0"/>
                         <a:t>Pond.</a:t>
                       </a:r>
                       <a:endParaRPr dirty="0"/>
@@ -17682,6 +17787,11 @@
                     </a:lnB>
                   </a:tcPr>
                 </a:tc>
+                <a:extLst>
+                  <a:ext uri="{0D108BD9-81ED-4DB2-BD59-A6C34878D82A}">
+                    <a16:rowId xmlns:a16="http://schemas.microsoft.com/office/drawing/2014/main" val="10000"/>
+                  </a:ext>
+                </a:extLst>
               </a:tr>
               <a:tr h="381000">
                 <a:tc>
@@ -17984,6 +18094,11 @@
                     </a:lnB>
                   </a:tcPr>
                 </a:tc>
+                <a:extLst>
+                  <a:ext uri="{0D108BD9-81ED-4DB2-BD59-A6C34878D82A}">
+                    <a16:rowId xmlns:a16="http://schemas.microsoft.com/office/drawing/2014/main" val="10001"/>
+                  </a:ext>
+                </a:extLst>
               </a:tr>
               <a:tr h="381000">
                 <a:tc>
@@ -18286,6 +18401,11 @@
                     </a:lnB>
                   </a:tcPr>
                 </a:tc>
+                <a:extLst>
+                  <a:ext uri="{0D108BD9-81ED-4DB2-BD59-A6C34878D82A}">
+                    <a16:rowId xmlns:a16="http://schemas.microsoft.com/office/drawing/2014/main" val="10002"/>
+                  </a:ext>
+                </a:extLst>
               </a:tr>
               <a:tr h="381000">
                 <a:tc>
@@ -18588,6 +18708,11 @@
                     </a:lnB>
                   </a:tcPr>
                 </a:tc>
+                <a:extLst>
+                  <a:ext uri="{0D108BD9-81ED-4DB2-BD59-A6C34878D82A}">
+                    <a16:rowId xmlns:a16="http://schemas.microsoft.com/office/drawing/2014/main" val="10003"/>
+                  </a:ext>
+                </a:extLst>
               </a:tr>
               <a:tr h="381000">
                 <a:tc>
@@ -18890,6 +19015,11 @@
                     </a:lnB>
                   </a:tcPr>
                 </a:tc>
+                <a:extLst>
+                  <a:ext uri="{0D108BD9-81ED-4DB2-BD59-A6C34878D82A}">
+                    <a16:rowId xmlns:a16="http://schemas.microsoft.com/office/drawing/2014/main" val="10004"/>
+                  </a:ext>
+                </a:extLst>
               </a:tr>
               <a:tr h="381000">
                 <a:tc>
@@ -19192,6 +19322,11 @@
                     </a:lnB>
                   </a:tcPr>
                 </a:tc>
+                <a:extLst>
+                  <a:ext uri="{0D108BD9-81ED-4DB2-BD59-A6C34878D82A}">
+                    <a16:rowId xmlns:a16="http://schemas.microsoft.com/office/drawing/2014/main" val="10005"/>
+                  </a:ext>
+                </a:extLst>
               </a:tr>
               <a:tr h="381000">
                 <a:tc>
@@ -19494,6 +19629,11 @@
                     </a:lnB>
                   </a:tcPr>
                 </a:tc>
+                <a:extLst>
+                  <a:ext uri="{0D108BD9-81ED-4DB2-BD59-A6C34878D82A}">
+                    <a16:rowId xmlns:a16="http://schemas.microsoft.com/office/drawing/2014/main" val="10006"/>
+                  </a:ext>
+                </a:extLst>
               </a:tr>
               <a:tr h="381000">
                 <a:tc>
@@ -19796,6 +19936,11 @@
                     </a:lnB>
                   </a:tcPr>
                 </a:tc>
+                <a:extLst>
+                  <a:ext uri="{0D108BD9-81ED-4DB2-BD59-A6C34878D82A}">
+                    <a16:rowId xmlns:a16="http://schemas.microsoft.com/office/drawing/2014/main" val="10007"/>
+                  </a:ext>
+                </a:extLst>
               </a:tr>
               <a:tr h="381000">
                 <a:tc>
@@ -20102,6 +20247,11 @@
                     </a:lnB>
                   </a:tcPr>
                 </a:tc>
+                <a:extLst>
+                  <a:ext uri="{0D108BD9-81ED-4DB2-BD59-A6C34878D82A}">
+                    <a16:rowId xmlns:a16="http://schemas.microsoft.com/office/drawing/2014/main" val="10008"/>
+                  </a:ext>
+                </a:extLst>
               </a:tr>
             </a:tbl>
           </a:graphicData>
@@ -21188,10 +21338,10 @@
               <a:buNone/>
             </a:pPr>
             <a:r>
-              <a:rPr lang="fr-CH"/>
-              <a:t>Angular 2</a:t>
+              <a:rPr lang="fr-CH" dirty="0" err="1"/>
+              <a:t>Angular</a:t>
             </a:r>
-            <a:endParaRPr/>
+            <a:endParaRPr dirty="0"/>
           </a:p>
         </p:txBody>
       </p:sp>

</xml_diff>